<commit_message>
updates + dash sign (without textures)
</commit_message>
<xml_diff>
--- a/doc/DarkLight.pptx
+++ b/doc/DarkLight.pptx
@@ -206,7 +206,7 @@
           <a:p>
             <a:fld id="{F4A39190-FC60-4AE6-BD3C-45F98D5A23A4}" type="datetimeFigureOut">
               <a:rPr lang="ru-RU" smtClean="0"/>
-              <a:t>25.04.2023</a:t>
+              <a:t>26.04.2023</a:t>
             </a:fld>
             <a:endParaRPr lang="ru-RU"/>
           </a:p>
@@ -602,7 +602,7 @@
           <a:p>
             <a:fld id="{F2E8C196-6E57-4D01-97F3-BE49650B6996}" type="datetimeFigureOut">
               <a:rPr lang="ru-RU" smtClean="0"/>
-              <a:t>25.04.2023</a:t>
+              <a:t>26.04.2023</a:t>
             </a:fld>
             <a:endParaRPr lang="ru-RU"/>
           </a:p>
@@ -782,7 +782,7 @@
           <a:p>
             <a:fld id="{F2E8C196-6E57-4D01-97F3-BE49650B6996}" type="datetimeFigureOut">
               <a:rPr lang="ru-RU" smtClean="0"/>
-              <a:t>25.04.2023</a:t>
+              <a:t>26.04.2023</a:t>
             </a:fld>
             <a:endParaRPr lang="ru-RU"/>
           </a:p>
@@ -972,7 +972,7 @@
           <a:p>
             <a:fld id="{F2E8C196-6E57-4D01-97F3-BE49650B6996}" type="datetimeFigureOut">
               <a:rPr lang="ru-RU" smtClean="0"/>
-              <a:t>25.04.2023</a:t>
+              <a:t>26.04.2023</a:t>
             </a:fld>
             <a:endParaRPr lang="ru-RU"/>
           </a:p>
@@ -1152,7 +1152,7 @@
           <a:p>
             <a:fld id="{F2E8C196-6E57-4D01-97F3-BE49650B6996}" type="datetimeFigureOut">
               <a:rPr lang="ru-RU" smtClean="0"/>
-              <a:t>25.04.2023</a:t>
+              <a:t>26.04.2023</a:t>
             </a:fld>
             <a:endParaRPr lang="ru-RU"/>
           </a:p>
@@ -1409,7 +1409,7 @@
           <a:p>
             <a:fld id="{F2E8C196-6E57-4D01-97F3-BE49650B6996}" type="datetimeFigureOut">
               <a:rPr lang="ru-RU" smtClean="0"/>
-              <a:t>25.04.2023</a:t>
+              <a:t>26.04.2023</a:t>
             </a:fld>
             <a:endParaRPr lang="ru-RU"/>
           </a:p>
@@ -1650,7 +1650,7 @@
           <a:p>
             <a:fld id="{F2E8C196-6E57-4D01-97F3-BE49650B6996}" type="datetimeFigureOut">
               <a:rPr lang="ru-RU" smtClean="0"/>
-              <a:t>25.04.2023</a:t>
+              <a:t>26.04.2023</a:t>
             </a:fld>
             <a:endParaRPr lang="ru-RU"/>
           </a:p>
@@ -2026,7 +2026,7 @@
           <a:p>
             <a:fld id="{F2E8C196-6E57-4D01-97F3-BE49650B6996}" type="datetimeFigureOut">
               <a:rPr lang="ru-RU" smtClean="0"/>
-              <a:t>25.04.2023</a:t>
+              <a:t>26.04.2023</a:t>
             </a:fld>
             <a:endParaRPr lang="ru-RU"/>
           </a:p>
@@ -2155,7 +2155,7 @@
           <a:p>
             <a:fld id="{F2E8C196-6E57-4D01-97F3-BE49650B6996}" type="datetimeFigureOut">
               <a:rPr lang="ru-RU" smtClean="0"/>
-              <a:t>25.04.2023</a:t>
+              <a:t>26.04.2023</a:t>
             </a:fld>
             <a:endParaRPr lang="ru-RU"/>
           </a:p>
@@ -2262,7 +2262,7 @@
           <a:p>
             <a:fld id="{F2E8C196-6E57-4D01-97F3-BE49650B6996}" type="datetimeFigureOut">
               <a:rPr lang="ru-RU" smtClean="0"/>
-              <a:t>25.04.2023</a:t>
+              <a:t>26.04.2023</a:t>
             </a:fld>
             <a:endParaRPr lang="ru-RU"/>
           </a:p>
@@ -2549,7 +2549,7 @@
           <a:p>
             <a:fld id="{F2E8C196-6E57-4D01-97F3-BE49650B6996}" type="datetimeFigureOut">
               <a:rPr lang="ru-RU" smtClean="0"/>
-              <a:t>25.04.2023</a:t>
+              <a:t>26.04.2023</a:t>
             </a:fld>
             <a:endParaRPr lang="ru-RU"/>
           </a:p>
@@ -2813,7 +2813,7 @@
           <a:p>
             <a:fld id="{F2E8C196-6E57-4D01-97F3-BE49650B6996}" type="datetimeFigureOut">
               <a:rPr lang="ru-RU" smtClean="0"/>
-              <a:t>25.04.2023</a:t>
+              <a:t>26.04.2023</a:t>
             </a:fld>
             <a:endParaRPr lang="ru-RU"/>
           </a:p>
@@ -3036,7 +3036,7 @@
           <a:p>
             <a:fld id="{F2E8C196-6E57-4D01-97F3-BE49650B6996}" type="datetimeFigureOut">
               <a:rPr lang="ru-RU" smtClean="0"/>
-              <a:t>25.04.2023</a:t>
+              <a:t>26.04.2023</a:t>
             </a:fld>
             <a:endParaRPr lang="ru-RU"/>
           </a:p>
@@ -3476,7 +3476,7 @@
           <a:lstStyle/>
           <a:p>
             <a:r>
-              <a:rPr lang="en-US" sz="7200" b="1" dirty="0" err="1">
+              <a:rPr lang="en-US" sz="7200" b="1" dirty="0">
                 <a:latin typeface="+mj-lt"/>
               </a:rPr>
               <a:t>DarkLight</a:t>
@@ -6106,14 +6106,13 @@
               </a:ext>
             </a:extLst>
           </a:blip>
-          <a:stretch>
-            <a:fillRect/>
-          </a:stretch>
+          <a:srcRect/>
+          <a:stretch/>
         </p:blipFill>
         <p:spPr>
-          <a:xfrm>
-            <a:off x="12143316" y="2068504"/>
-            <a:ext cx="1714500" cy="2857500"/>
+          <a:xfrm flipH="1">
+            <a:off x="12315531" y="2316469"/>
+            <a:ext cx="1370071" cy="2361570"/>
           </a:xfrm>
           <a:prstGeom prst="rect">
             <a:avLst/>

</xml_diff>